<commit_message>
79 - English presentation ( https://italent.cloudapp.net:9443/ccm/web/projects/iTalent#action=com.ibm.team.workitem.viewWorkItem&id=79 )
</commit_message>
<xml_diff>
--- a/italent/documents/english/EnglishPresentation.pptx
+++ b/italent/documents/english/EnglishPresentation.pptx
@@ -3283,35 +3283,75 @@
             </a:br>
             <a:r>
               <a:rPr lang="nl-BE" dirty="0" smtClean="0"/>
-              <a:t>- web application</a:t>
+              <a:t>- </a:t>
+            </a:r>
+            <a:r>
+              <a:rPr lang="nl-BE" dirty="0" smtClean="0"/>
+              <a:t>Web Application</a:t>
+            </a:r>
+            <a:r>
+              <a:rPr lang="nl-BE" dirty="0" smtClean="0"/>
+              <a:t/>
             </a:r>
             <a:br>
               <a:rPr lang="nl-BE" dirty="0" smtClean="0"/>
             </a:br>
             <a:r>
               <a:rPr lang="nl-BE" dirty="0" smtClean="0"/>
-              <a:t>- kickstarter</a:t>
+              <a:t>- </a:t>
+            </a:r>
+            <a:r>
+              <a:rPr lang="nl-BE" dirty="0" smtClean="0"/>
+              <a:t>Kickstarter</a:t>
+            </a:r>
+            <a:r>
+              <a:rPr lang="nl-BE" dirty="0" smtClean="0"/>
+              <a:t/>
             </a:r>
             <a:br>
               <a:rPr lang="nl-BE" dirty="0" smtClean="0"/>
             </a:br>
             <a:r>
               <a:rPr lang="nl-BE" dirty="0" smtClean="0"/>
-              <a:t>- pitch idea with media</a:t>
+              <a:t>- </a:t>
+            </a:r>
+            <a:r>
+              <a:rPr lang="nl-BE" dirty="0" smtClean="0"/>
+              <a:t>Pitch </a:t>
+            </a:r>
+            <a:r>
+              <a:rPr lang="nl-BE" dirty="0" smtClean="0"/>
+              <a:t>idea with media</a:t>
             </a:r>
             <a:br>
               <a:rPr lang="nl-BE" dirty="0" smtClean="0"/>
             </a:br>
             <a:r>
               <a:rPr lang="nl-BE" dirty="0" smtClean="0"/>
-              <a:t>- like/subscribe</a:t>
+              <a:t>- </a:t>
+            </a:r>
+            <a:r>
+              <a:rPr lang="nl-BE" dirty="0" smtClean="0"/>
+              <a:t>Like/Subscribe</a:t>
+            </a:r>
+            <a:r>
+              <a:rPr lang="nl-BE" dirty="0" smtClean="0"/>
+              <a:t/>
             </a:r>
             <a:br>
               <a:rPr lang="nl-BE" dirty="0" smtClean="0"/>
             </a:br>
             <a:r>
               <a:rPr lang="nl-BE" dirty="0" smtClean="0"/>
-              <a:t>- status updates</a:t>
+              <a:t>- </a:t>
+            </a:r>
+            <a:r>
+              <a:rPr lang="nl-BE" dirty="0" smtClean="0"/>
+              <a:t>Status Updates</a:t>
+            </a:r>
+            <a:r>
+              <a:rPr lang="nl-BE" dirty="0" smtClean="0"/>
+              <a:t/>
             </a:r>
             <a:br>
               <a:rPr lang="nl-BE" dirty="0" smtClean="0"/>
@@ -3389,8 +3429,8 @@
         </p:nvSpPr>
         <p:spPr>
           <a:xfrm>
-            <a:off x="2987824" y="1628800"/>
-            <a:ext cx="3898776" cy="4525963"/>
+            <a:off x="2627784" y="1772816"/>
+            <a:ext cx="4032448" cy="4525963"/>
           </a:xfrm>
         </p:spPr>
         <p:txBody>
@@ -3454,7 +3494,7 @@
             <a:pPr lvl="0"/>
             <a:r>
               <a:rPr lang="en-US" dirty="0" smtClean="0"/>
-              <a:t>Documentation</a:t>
+              <a:t>Quality Management</a:t>
             </a:r>
             <a:endParaRPr lang="nl-BE" dirty="0"/>
           </a:p>

</xml_diff>